<commit_message>
photos and unit 0 updates
</commit_message>
<xml_diff>
--- a/_PowerPoints/1st Semester/Unit 0 Introduction/Next 4 days of Class/PreCalc_Day_001.pptx
+++ b/_PowerPoints/1st Semester/Unit 0 Introduction/Next 4 days of Class/PreCalc_Day_001.pptx
@@ -216,7 +216,7 @@
           <a:p>
             <a:fld id="{FDC74F93-3CDB-254B-A713-DEBB783BCF51}" type="datetimeFigureOut">
               <a:rPr lang="en-US" smtClean="0"/>
-              <a:t>8/20/17</a:t>
+              <a:t>8/29/2018</a:t>
             </a:fld>
             <a:endParaRPr lang="en-US"/>
           </a:p>
@@ -654,7 +654,7 @@
             <a:fld id="{87DE6118-2437-4B30-8E3C-4D2BE6020583}" type="datetimeFigureOut">
               <a:rPr lang="en-US" dirty="0"/>
               <a:pPr/>
-              <a:t>8/20/17</a:t>
+              <a:t>8/29/2018</a:t>
             </a:fld>
             <a:endParaRPr lang="en-US" dirty="0"/>
           </a:p>
@@ -980,7 +980,7 @@
           <a:p>
             <a:fld id="{87DE6118-2437-4B30-8E3C-4D2BE6020583}" type="datetimeFigureOut">
               <a:rPr lang="en-US" dirty="0"/>
-              <a:t>8/20/17</a:t>
+              <a:t>8/29/2018</a:t>
             </a:fld>
             <a:endParaRPr lang="en-US" dirty="0"/>
           </a:p>
@@ -1155,7 +1155,7 @@
           <a:p>
             <a:fld id="{87DE6118-2437-4B30-8E3C-4D2BE6020583}" type="datetimeFigureOut">
               <a:rPr lang="en-US" dirty="0"/>
-              <a:t>8/20/17</a:t>
+              <a:t>8/29/2018</a:t>
             </a:fld>
             <a:endParaRPr lang="en-US" dirty="0"/>
           </a:p>
@@ -1320,7 +1320,7 @@
           <a:p>
             <a:fld id="{87DE6118-2437-4B30-8E3C-4D2BE6020583}" type="datetimeFigureOut">
               <a:rPr lang="en-US" dirty="0"/>
-              <a:t>8/20/17</a:t>
+              <a:t>8/29/2018</a:t>
             </a:fld>
             <a:endParaRPr lang="en-US" dirty="0"/>
           </a:p>
@@ -1593,7 +1593,7 @@
             <a:fld id="{87DE6118-2437-4B30-8E3C-4D2BE6020583}" type="datetimeFigureOut">
               <a:rPr lang="en-US" dirty="0"/>
               <a:pPr/>
-              <a:t>8/20/17</a:t>
+              <a:t>8/29/2018</a:t>
             </a:fld>
             <a:endParaRPr lang="en-US" dirty="0"/>
           </a:p>
@@ -1983,7 +1983,7 @@
           <a:p>
             <a:fld id="{87DE6118-2437-4B30-8E3C-4D2BE6020583}" type="datetimeFigureOut">
               <a:rPr lang="en-US" dirty="0"/>
-              <a:t>8/20/17</a:t>
+              <a:t>8/29/2018</a:t>
             </a:fld>
             <a:endParaRPr lang="en-US" dirty="0"/>
           </a:p>
@@ -2455,7 +2455,7 @@
           <a:p>
             <a:fld id="{87DE6118-2437-4B30-8E3C-4D2BE6020583}" type="datetimeFigureOut">
               <a:rPr lang="en-US" dirty="0"/>
-              <a:t>8/20/17</a:t>
+              <a:t>8/29/2018</a:t>
             </a:fld>
             <a:endParaRPr lang="en-US" dirty="0"/>
           </a:p>
@@ -2568,7 +2568,7 @@
           <a:p>
             <a:fld id="{87DE6118-2437-4B30-8E3C-4D2BE6020583}" type="datetimeFigureOut">
               <a:rPr lang="en-US" dirty="0"/>
-              <a:t>8/20/17</a:t>
+              <a:t>8/29/2018</a:t>
             </a:fld>
             <a:endParaRPr lang="en-US" dirty="0"/>
           </a:p>
@@ -2658,7 +2658,7 @@
           <a:p>
             <a:fld id="{87DE6118-2437-4B30-8E3C-4D2BE6020583}" type="datetimeFigureOut">
               <a:rPr lang="en-US" dirty="0"/>
-              <a:t>8/20/17</a:t>
+              <a:t>8/29/2018</a:t>
             </a:fld>
             <a:endParaRPr lang="en-US" dirty="0"/>
           </a:p>
@@ -3000,7 +3000,7 @@
             <a:fld id="{87DE6118-2437-4B30-8E3C-4D2BE6020583}" type="datetimeFigureOut">
               <a:rPr lang="en-US" dirty="0"/>
               <a:pPr/>
-              <a:t>8/20/17</a:t>
+              <a:t>8/29/2018</a:t>
             </a:fld>
             <a:endParaRPr lang="en-US" dirty="0"/>
           </a:p>
@@ -3385,7 +3385,7 @@
             <a:fld id="{87DE6118-2437-4B30-8E3C-4D2BE6020583}" type="datetimeFigureOut">
               <a:rPr lang="en-US" dirty="0"/>
               <a:pPr/>
-              <a:t>8/20/17</a:t>
+              <a:t>8/29/2018</a:t>
             </a:fld>
             <a:endParaRPr lang="en-US" dirty="0"/>
           </a:p>
@@ -3660,7 +3660,7 @@
             <a:fld id="{87DE6118-2437-4B30-8E3C-4D2BE6020583}" type="datetimeFigureOut">
               <a:rPr lang="en-US" dirty="0"/>
               <a:pPr/>
-              <a:t>8/20/17</a:t>
+              <a:t>8/29/2018</a:t>
             </a:fld>
             <a:endParaRPr lang="en-US" dirty="0"/>
           </a:p>
@@ -6855,8 +6855,8 @@
         </p:nvSpPr>
         <p:spPr>
           <a:xfrm>
-            <a:off x="1371600" y="1938528"/>
-            <a:ext cx="9601200" cy="3581400"/>
+            <a:off x="1371599" y="1938528"/>
+            <a:ext cx="10589559" cy="3581400"/>
           </a:xfrm>
         </p:spPr>
         <p:txBody>
@@ -6867,7 +6867,15 @@
           <a:p>
             <a:r>
               <a:rPr lang="en-US" sz="3000" dirty="0" smtClean="0"/>
-              <a:t>Grab a calculator as you come in to the room</a:t>
+              <a:t>Grab a </a:t>
+            </a:r>
+            <a:r>
+              <a:rPr lang="en-US" sz="3000" dirty="0" smtClean="0"/>
+              <a:t>calculator, board, and book </a:t>
+            </a:r>
+            <a:r>
+              <a:rPr lang="en-US" sz="3000" dirty="0" smtClean="0"/>
+              <a:t>as you come in to the room</a:t>
             </a:r>
           </a:p>
           <a:p>
@@ -6878,12 +6886,8 @@
           </a:p>
           <a:p>
             <a:r>
-              <a:rPr lang="en-US" sz="3000" smtClean="0"/>
-              <a:t>Begin to </a:t>
-            </a:r>
-            <a:r>
               <a:rPr lang="en-US" sz="3000" dirty="0" smtClean="0"/>
-              <a:t>work on Bell Work</a:t>
+              <a:t>Begin to work on Bell Work</a:t>
             </a:r>
           </a:p>
           <a:p>

</xml_diff>